<commit_message>
update for fix bugs
</commit_message>
<xml_diff>
--- a/MySQL实战/03事务隔离：为什么你改了我还看不见？.pptx
+++ b/MySQL实战/03事务隔离：为什么你改了我还看不见？.pptx
@@ -301,7 +301,7 @@
           <a:p>
             <a:fld id="{E396512D-F96B-4538-B91A-F7EB57A489A0}" type="datetimeFigureOut">
               <a:rPr lang="zh-CN" altLang="en-US" smtClean="0"/>
-              <a:t>2019/5/9</a:t>
+              <a:t>2020/1/19</a:t>
             </a:fld>
             <a:endParaRPr lang="zh-CN" altLang="en-US"/>
           </a:p>
@@ -576,7 +576,7 @@
           <a:p>
             <a:fld id="{E396512D-F96B-4538-B91A-F7EB57A489A0}" type="datetimeFigureOut">
               <a:rPr lang="zh-CN" altLang="en-US" smtClean="0"/>
-              <a:t>2019/5/9</a:t>
+              <a:t>2020/1/19</a:t>
             </a:fld>
             <a:endParaRPr lang="zh-CN" altLang="en-US"/>
           </a:p>
@@ -770,7 +770,7 @@
           <a:p>
             <a:fld id="{E396512D-F96B-4538-B91A-F7EB57A489A0}" type="datetimeFigureOut">
               <a:rPr lang="zh-CN" altLang="en-US" smtClean="0"/>
-              <a:t>2019/5/9</a:t>
+              <a:t>2020/1/19</a:t>
             </a:fld>
             <a:endParaRPr lang="zh-CN" altLang="en-US"/>
           </a:p>
@@ -1043,7 +1043,7 @@
           <a:p>
             <a:fld id="{E396512D-F96B-4538-B91A-F7EB57A489A0}" type="datetimeFigureOut">
               <a:rPr lang="zh-CN" altLang="en-US" smtClean="0"/>
-              <a:t>2019/5/9</a:t>
+              <a:t>2020/1/19</a:t>
             </a:fld>
             <a:endParaRPr lang="zh-CN" altLang="en-US"/>
           </a:p>
@@ -1384,7 +1384,7 @@
           <a:p>
             <a:fld id="{E396512D-F96B-4538-B91A-F7EB57A489A0}" type="datetimeFigureOut">
               <a:rPr lang="zh-CN" altLang="en-US" smtClean="0"/>
-              <a:t>2019/5/9</a:t>
+              <a:t>2020/1/19</a:t>
             </a:fld>
             <a:endParaRPr lang="zh-CN" altLang="en-US"/>
           </a:p>
@@ -2007,7 +2007,7 @@
           <a:p>
             <a:fld id="{E396512D-F96B-4538-B91A-F7EB57A489A0}" type="datetimeFigureOut">
               <a:rPr lang="zh-CN" altLang="en-US" smtClean="0"/>
-              <a:t>2019/5/9</a:t>
+              <a:t>2020/1/19</a:t>
             </a:fld>
             <a:endParaRPr lang="zh-CN" altLang="en-US"/>
           </a:p>
@@ -2867,7 +2867,7 @@
           <a:p>
             <a:fld id="{E396512D-F96B-4538-B91A-F7EB57A489A0}" type="datetimeFigureOut">
               <a:rPr lang="zh-CN" altLang="en-US" smtClean="0"/>
-              <a:t>2019/5/9</a:t>
+              <a:t>2020/1/19</a:t>
             </a:fld>
             <a:endParaRPr lang="zh-CN" altLang="en-US"/>
           </a:p>
@@ -3037,7 +3037,7 @@
           <a:p>
             <a:fld id="{E396512D-F96B-4538-B91A-F7EB57A489A0}" type="datetimeFigureOut">
               <a:rPr lang="zh-CN" altLang="en-US" smtClean="0"/>
-              <a:t>2019/5/9</a:t>
+              <a:t>2020/1/19</a:t>
             </a:fld>
             <a:endParaRPr lang="zh-CN" altLang="en-US"/>
           </a:p>
@@ -3217,7 +3217,7 @@
           <a:p>
             <a:fld id="{E396512D-F96B-4538-B91A-F7EB57A489A0}" type="datetimeFigureOut">
               <a:rPr lang="zh-CN" altLang="en-US" smtClean="0"/>
-              <a:t>2019/5/9</a:t>
+              <a:t>2020/1/19</a:t>
             </a:fld>
             <a:endParaRPr lang="zh-CN" altLang="en-US"/>
           </a:p>
@@ -3387,7 +3387,7 @@
           <a:p>
             <a:fld id="{E396512D-F96B-4538-B91A-F7EB57A489A0}" type="datetimeFigureOut">
               <a:rPr lang="zh-CN" altLang="en-US" smtClean="0"/>
-              <a:t>2019/5/9</a:t>
+              <a:t>2020/1/19</a:t>
             </a:fld>
             <a:endParaRPr lang="zh-CN" altLang="en-US"/>
           </a:p>
@@ -3634,7 +3634,7 @@
           <a:p>
             <a:fld id="{E396512D-F96B-4538-B91A-F7EB57A489A0}" type="datetimeFigureOut">
               <a:rPr lang="zh-CN" altLang="en-US" smtClean="0"/>
-              <a:t>2019/5/9</a:t>
+              <a:t>2020/1/19</a:t>
             </a:fld>
             <a:endParaRPr lang="zh-CN" altLang="en-US"/>
           </a:p>
@@ -3926,7 +3926,7 @@
           <a:p>
             <a:fld id="{E396512D-F96B-4538-B91A-F7EB57A489A0}" type="datetimeFigureOut">
               <a:rPr lang="zh-CN" altLang="en-US" smtClean="0"/>
-              <a:t>2019/5/9</a:t>
+              <a:t>2020/1/19</a:t>
             </a:fld>
             <a:endParaRPr lang="zh-CN" altLang="en-US"/>
           </a:p>
@@ -4370,7 +4370,7 @@
           <a:p>
             <a:fld id="{E396512D-F96B-4538-B91A-F7EB57A489A0}" type="datetimeFigureOut">
               <a:rPr lang="zh-CN" altLang="en-US" smtClean="0"/>
-              <a:t>2019/5/9</a:t>
+              <a:t>2020/1/19</a:t>
             </a:fld>
             <a:endParaRPr lang="zh-CN" altLang="en-US"/>
           </a:p>
@@ -4488,7 +4488,7 @@
           <a:p>
             <a:fld id="{E396512D-F96B-4538-B91A-F7EB57A489A0}" type="datetimeFigureOut">
               <a:rPr lang="zh-CN" altLang="en-US" smtClean="0"/>
-              <a:t>2019/5/9</a:t>
+              <a:t>2020/1/19</a:t>
             </a:fld>
             <a:endParaRPr lang="zh-CN" altLang="en-US"/>
           </a:p>
@@ -4583,7 +4583,7 @@
           <a:p>
             <a:fld id="{E396512D-F96B-4538-B91A-F7EB57A489A0}" type="datetimeFigureOut">
               <a:rPr lang="zh-CN" altLang="en-US" smtClean="0"/>
-              <a:t>2019/5/9</a:t>
+              <a:t>2020/1/19</a:t>
             </a:fld>
             <a:endParaRPr lang="zh-CN" altLang="en-US"/>
           </a:p>
@@ -4862,7 +4862,7 @@
           <a:p>
             <a:fld id="{E396512D-F96B-4538-B91A-F7EB57A489A0}" type="datetimeFigureOut">
               <a:rPr lang="zh-CN" altLang="en-US" smtClean="0"/>
-              <a:t>2019/5/9</a:t>
+              <a:t>2020/1/19</a:t>
             </a:fld>
             <a:endParaRPr lang="zh-CN" altLang="en-US"/>
           </a:p>
@@ -5137,7 +5137,7 @@
           <a:p>
             <a:fld id="{E396512D-F96B-4538-B91A-F7EB57A489A0}" type="datetimeFigureOut">
               <a:rPr lang="zh-CN" altLang="en-US" smtClean="0"/>
-              <a:t>2019/5/9</a:t>
+              <a:t>2020/1/19</a:t>
             </a:fld>
             <a:endParaRPr lang="zh-CN" altLang="en-US"/>
           </a:p>
@@ -5566,7 +5566,7 @@
           <a:p>
             <a:fld id="{E396512D-F96B-4538-B91A-F7EB57A489A0}" type="datetimeFigureOut">
               <a:rPr lang="zh-CN" altLang="en-US" smtClean="0"/>
-              <a:t>2019/5/9</a:t>
+              <a:t>2020/1/19</a:t>
             </a:fld>
             <a:endParaRPr lang="zh-CN" altLang="en-US"/>
           </a:p>
@@ -6128,10 +6128,6 @@
               </a:rPr>
               <a:t>事务隔离：为什么你改了我还看不见？</a:t>
             </a:r>
-            <a:endParaRPr lang="zh-CN" altLang="en-US" sz="3200" b="1" dirty="0">
-              <a:latin typeface="微软雅黑" panose="020B0503020204020204" pitchFamily="34" charset="-122"/>
-              <a:ea typeface="微软雅黑" panose="020B0503020204020204" pitchFamily="34" charset="-122"/>
-            </a:endParaRPr>
           </a:p>
         </p:txBody>
       </p:sp>
@@ -6288,10 +6284,6 @@
               </a:rPr>
               <a:t>事务隔离：为什么你改了我还看不见？</a:t>
             </a:r>
-            <a:endParaRPr lang="zh-CN" altLang="en-US" sz="3200" b="1" dirty="0">
-              <a:latin typeface="微软雅黑" panose="020B0503020204020204" pitchFamily="34" charset="-122"/>
-              <a:ea typeface="微软雅黑" panose="020B0503020204020204" pitchFamily="34" charset="-122"/>
-            </a:endParaRPr>
           </a:p>
         </p:txBody>
       </p:sp>
@@ -6416,11 +6408,25 @@
           </a:p>
           <a:p>
             <a:r>
+              <a:rPr lang="zh-CN" altLang="en-US" smtClean="0">
+                <a:latin typeface="微软雅黑" panose="020B0503020204020204" pitchFamily="34" charset="-122"/>
+                <a:ea typeface="微软雅黑" panose="020B0503020204020204" pitchFamily="34" charset="-122"/>
+              </a:rPr>
+              <a:t>一</a:t>
+            </a:r>
+            <a:r>
+              <a:rPr lang="zh-CN" altLang="en-US" smtClean="0">
+                <a:latin typeface="微软雅黑" panose="020B0503020204020204" pitchFamily="34" charset="-122"/>
+                <a:ea typeface="微软雅黑" panose="020B0503020204020204" pitchFamily="34" charset="-122"/>
+              </a:rPr>
+              <a:t>个事务还</a:t>
+            </a:r>
+            <a:r>
               <a:rPr lang="zh-CN" altLang="en-US" dirty="0" smtClean="0">
                 <a:latin typeface="微软雅黑" panose="020B0503020204020204" pitchFamily="34" charset="-122"/>
                 <a:ea typeface="微软雅黑" panose="020B0503020204020204" pitchFamily="34" charset="-122"/>
               </a:rPr>
-              <a:t>一个事物还没提交时，它做的变更就能被别的事务看到。会产生脏读。</a:t>
+              <a:t>没提交时，它做的变更就能被别的事务看到。会产生脏读。</a:t>
             </a:r>
             <a:endParaRPr lang="en-US" altLang="zh-CN" dirty="0" smtClean="0">
               <a:latin typeface="微软雅黑" panose="020B0503020204020204" pitchFamily="34" charset="-122"/>
@@ -6472,7 +6478,21 @@
                 <a:latin typeface="微软雅黑" panose="020B0503020204020204" pitchFamily="34" charset="-122"/>
                 <a:ea typeface="微软雅黑" panose="020B0503020204020204" pitchFamily="34" charset="-122"/>
               </a:rPr>
-              <a:t>一个事物提交之后，它做的变更才会被其他事务看到。</a:t>
+              <a:t>一</a:t>
+            </a:r>
+            <a:r>
+              <a:rPr lang="zh-CN" altLang="en-US" dirty="0" smtClean="0">
+                <a:latin typeface="微软雅黑" panose="020B0503020204020204" pitchFamily="34" charset="-122"/>
+                <a:ea typeface="微软雅黑" panose="020B0503020204020204" pitchFamily="34" charset="-122"/>
+              </a:rPr>
+              <a:t>个事务提交</a:t>
+            </a:r>
+            <a:r>
+              <a:rPr lang="zh-CN" altLang="en-US" dirty="0" smtClean="0">
+                <a:latin typeface="微软雅黑" panose="020B0503020204020204" pitchFamily="34" charset="-122"/>
+                <a:ea typeface="微软雅黑" panose="020B0503020204020204" pitchFamily="34" charset="-122"/>
+              </a:rPr>
+              <a:t>之后，它做的变更才会被其他事务看到。</a:t>
             </a:r>
             <a:endParaRPr lang="en-US" altLang="zh-CN" dirty="0" smtClean="0">
               <a:latin typeface="微软雅黑" panose="020B0503020204020204" pitchFamily="34" charset="-122"/>
@@ -6544,14 +6564,49 @@
                 <a:latin typeface="微软雅黑" panose="020B0503020204020204" pitchFamily="34" charset="-122"/>
                 <a:ea typeface="微软雅黑" panose="020B0503020204020204" pitchFamily="34" charset="-122"/>
               </a:rPr>
-              <a:t>一个</a:t>
+              <a:t>一</a:t>
             </a:r>
             <a:r>
               <a:rPr lang="zh-CN" altLang="en-US" dirty="0" smtClean="0">
                 <a:latin typeface="微软雅黑" panose="020B0503020204020204" pitchFamily="34" charset="-122"/>
                 <a:ea typeface="微软雅黑" panose="020B0503020204020204" pitchFamily="34" charset="-122"/>
               </a:rPr>
-              <a:t>事物执行过程中看大的数据，总是跟这个事务在启动时看到的数据是一致的。</a:t>
+              <a:t>个事务执行</a:t>
+            </a:r>
+            <a:r>
+              <a:rPr lang="zh-CN" altLang="en-US" dirty="0" smtClean="0">
+                <a:latin typeface="微软雅黑" panose="020B0503020204020204" pitchFamily="34" charset="-122"/>
+                <a:ea typeface="微软雅黑" panose="020B0503020204020204" pitchFamily="34" charset="-122"/>
+              </a:rPr>
+              <a:t>过程</a:t>
+            </a:r>
+            <a:r>
+              <a:rPr lang="zh-CN" altLang="en-US" dirty="0" smtClean="0">
+                <a:latin typeface="微软雅黑" panose="020B0503020204020204" pitchFamily="34" charset="-122"/>
+                <a:ea typeface="微软雅黑" panose="020B0503020204020204" pitchFamily="34" charset="-122"/>
+              </a:rPr>
+              <a:t>中看</a:t>
+            </a:r>
+            <a:r>
+              <a:rPr lang="zh-CN" altLang="en-US" dirty="0">
+                <a:latin typeface="微软雅黑" panose="020B0503020204020204" pitchFamily="34" charset="-122"/>
+                <a:ea typeface="微软雅黑" panose="020B0503020204020204" pitchFamily="34" charset="-122"/>
+              </a:rPr>
+              <a:t>到</a:t>
+            </a:r>
+            <a:r>
+              <a:rPr lang="zh-CN" altLang="en-US" dirty="0" smtClean="0">
+                <a:latin typeface="微软雅黑" panose="020B0503020204020204" pitchFamily="34" charset="-122"/>
+                <a:ea typeface="微软雅黑" panose="020B0503020204020204" pitchFamily="34" charset="-122"/>
+              </a:rPr>
+              <a:t>的</a:t>
+            </a:r>
+            <a:r>
+              <a:rPr lang="zh-CN" altLang="en-US" dirty="0" smtClean="0">
+                <a:latin typeface="微软雅黑" panose="020B0503020204020204" pitchFamily="34" charset="-122"/>
+                <a:ea typeface="微软雅黑" panose="020B0503020204020204" pitchFamily="34" charset="-122"/>
+              </a:rPr>
+              <a:t>数据，总是跟这个事务在启动时看到的数据是一致的。</a:t>
             </a:r>
             <a:endParaRPr lang="en-US" altLang="zh-CN" dirty="0" smtClean="0">
               <a:latin typeface="微软雅黑" panose="020B0503020204020204" pitchFamily="34" charset="-122"/>
@@ -6847,10 +6902,6 @@
               </a:rPr>
               <a:t>事务隔离：为什么你改了我还看不见？</a:t>
             </a:r>
-            <a:endParaRPr lang="zh-CN" altLang="en-US" sz="3200" b="1" dirty="0">
-              <a:latin typeface="微软雅黑" panose="020B0503020204020204" pitchFamily="34" charset="-122"/>
-              <a:ea typeface="微软雅黑" panose="020B0503020204020204" pitchFamily="34" charset="-122"/>
-            </a:endParaRPr>
           </a:p>
         </p:txBody>
       </p:sp>
@@ -7805,10 +7856,6 @@
               </a:rPr>
               <a:t>视图</a:t>
             </a:r>
-            <a:endParaRPr lang="zh-CN" altLang="en-US" sz="1200" dirty="0">
-              <a:latin typeface="微软雅黑" panose="020B0503020204020204" pitchFamily="34" charset="-122"/>
-              <a:ea typeface="微软雅黑" panose="020B0503020204020204" pitchFamily="34" charset="-122"/>
-            </a:endParaRPr>
           </a:p>
         </p:txBody>
       </p:sp>
@@ -7911,10 +7958,6 @@
               </a:rPr>
               <a:t>视图</a:t>
             </a:r>
-            <a:endParaRPr lang="zh-CN" altLang="en-US" sz="1200" dirty="0">
-              <a:latin typeface="微软雅黑" panose="020B0503020204020204" pitchFamily="34" charset="-122"/>
-              <a:ea typeface="微软雅黑" panose="020B0503020204020204" pitchFamily="34" charset="-122"/>
-            </a:endParaRPr>
           </a:p>
         </p:txBody>
       </p:sp>
@@ -8067,10 +8110,6 @@
               </a:rPr>
               <a:t>视图</a:t>
             </a:r>
-            <a:endParaRPr lang="zh-CN" altLang="en-US" sz="1200" dirty="0">
-              <a:latin typeface="微软雅黑" panose="020B0503020204020204" pitchFamily="34" charset="-122"/>
-              <a:ea typeface="微软雅黑" panose="020B0503020204020204" pitchFamily="34" charset="-122"/>
-            </a:endParaRPr>
           </a:p>
         </p:txBody>
       </p:sp>
@@ -8117,10 +8156,6 @@
               </a:rPr>
               <a:t>视图</a:t>
             </a:r>
-            <a:endParaRPr lang="zh-CN" altLang="en-US" sz="1200" dirty="0">
-              <a:latin typeface="微软雅黑" panose="020B0503020204020204" pitchFamily="34" charset="-122"/>
-              <a:ea typeface="微软雅黑" panose="020B0503020204020204" pitchFamily="34" charset="-122"/>
-            </a:endParaRPr>
           </a:p>
         </p:txBody>
       </p:sp>
@@ -8436,10 +8471,6 @@
               </a:rPr>
               <a:t>事务隔离：为什么你改了我还看不见？</a:t>
             </a:r>
-            <a:endParaRPr lang="zh-CN" altLang="en-US" sz="3200" b="1" dirty="0">
-              <a:latin typeface="微软雅黑" panose="020B0503020204020204" pitchFamily="34" charset="-122"/>
-              <a:ea typeface="微软雅黑" panose="020B0503020204020204" pitchFamily="34" charset="-122"/>
-            </a:endParaRPr>
           </a:p>
         </p:txBody>
       </p:sp>
@@ -8502,14 +8533,6 @@
               </a:rPr>
               <a:t>隔离的实现</a:t>
             </a:r>
-            <a:endParaRPr lang="zh-CN" altLang="en-US" b="1" dirty="0">
-              <a:ln/>
-              <a:solidFill>
-                <a:srgbClr val="4FD1FF"/>
-              </a:solidFill>
-              <a:latin typeface="微软雅黑" panose="020B0503020204020204" pitchFamily="34" charset="-122"/>
-              <a:ea typeface="微软雅黑" panose="020B0503020204020204" pitchFamily="34" charset="-122"/>
-            </a:endParaRPr>
           </a:p>
         </p:txBody>
       </p:sp>

</xml_diff>